<commit_message>
Add Spanish spec part 3
</commit_message>
<xml_diff>
--- a/Specification/Spanish/Editable source images/Imágenes Spec Parte 3 - Diagramas CPU.pptx
+++ b/Specification/Spanish/Editable source images/Imágenes Spec Parte 3 - Diagramas CPU.pptx
@@ -107,7 +107,7 @@
   </p:defaultTextStyle>
   <p:extLst>
     <p:ext uri="{EFAFB233-063F-42B5-8137-9DF3F51BA10A}">
-      <p15:sldGuideLst xmlns:p15="http://schemas.microsoft.com/office/powerpoint/2012/main" xmlns="">
+      <p15:sldGuideLst xmlns="" xmlns:p15="http://schemas.microsoft.com/office/powerpoint/2012/main">
         <p15:guide id="1" orient="horz" pos="2160">
           <p15:clr>
             <a:srgbClr val="A4A3A4"/>
@@ -146,7 +146,7 @@
           <p:cNvPr id="2" name="Título 1">
             <a:extLst>
               <a:ext uri="{FF2B5EF4-FFF2-40B4-BE49-F238E27FC236}">
-                <a16:creationId xmlns:a16="http://schemas.microsoft.com/office/drawing/2014/main" xmlns="" id="{E3B9DF4B-0C72-4846-9560-CA4C0EF12637}"/>
+                <a16:creationId xmlns="" xmlns:a16="http://schemas.microsoft.com/office/drawing/2014/main" id="{E3B9DF4B-0C72-4846-9560-CA4C0EF12637}"/>
               </a:ext>
             </a:extLst>
           </p:cNvPr>
@@ -183,7 +183,7 @@
           <p:cNvPr id="3" name="Subtítulo 2">
             <a:extLst>
               <a:ext uri="{FF2B5EF4-FFF2-40B4-BE49-F238E27FC236}">
-                <a16:creationId xmlns:a16="http://schemas.microsoft.com/office/drawing/2014/main" xmlns="" id="{685B1628-0B9C-4511-8020-749CB381CA8A}"/>
+                <a16:creationId xmlns="" xmlns:a16="http://schemas.microsoft.com/office/drawing/2014/main" id="{685B1628-0B9C-4511-8020-749CB381CA8A}"/>
               </a:ext>
             </a:extLst>
           </p:cNvPr>
@@ -253,7 +253,7 @@
           <p:cNvPr id="4" name="Marcador de fecha 3">
             <a:extLst>
               <a:ext uri="{FF2B5EF4-FFF2-40B4-BE49-F238E27FC236}">
-                <a16:creationId xmlns:a16="http://schemas.microsoft.com/office/drawing/2014/main" xmlns="" id="{94B80B3E-D487-4AED-BB83-C0CCE4C60C28}"/>
+                <a16:creationId xmlns="" xmlns:a16="http://schemas.microsoft.com/office/drawing/2014/main" id="{94B80B3E-D487-4AED-BB83-C0CCE4C60C28}"/>
               </a:ext>
             </a:extLst>
           </p:cNvPr>
@@ -272,7 +272,7 @@
             <a:fld id="{EFBC5A1B-75D9-4BC9-8C41-860857045191}" type="datetimeFigureOut">
               <a:rPr lang="es-ES" smtClean="0"/>
               <a:pPr/>
-              <a:t>10/12/2023</a:t>
+              <a:t>13/12/2023</a:t>
             </a:fld>
             <a:endParaRPr lang="es-ES"/>
           </a:p>
@@ -283,7 +283,7 @@
           <p:cNvPr id="5" name="Marcador de pie de página 4">
             <a:extLst>
               <a:ext uri="{FF2B5EF4-FFF2-40B4-BE49-F238E27FC236}">
-                <a16:creationId xmlns:a16="http://schemas.microsoft.com/office/drawing/2014/main" xmlns="" id="{4C360251-304A-4F05-98C3-0F4C6ACE97D7}"/>
+                <a16:creationId xmlns="" xmlns:a16="http://schemas.microsoft.com/office/drawing/2014/main" id="{4C360251-304A-4F05-98C3-0F4C6ACE97D7}"/>
               </a:ext>
             </a:extLst>
           </p:cNvPr>
@@ -308,7 +308,7 @@
           <p:cNvPr id="6" name="Marcador de número de diapositiva 5">
             <a:extLst>
               <a:ext uri="{FF2B5EF4-FFF2-40B4-BE49-F238E27FC236}">
-                <a16:creationId xmlns:a16="http://schemas.microsoft.com/office/drawing/2014/main" xmlns="" id="{6799EFD0-FF52-4DE6-868B-77F17D2F4FF0}"/>
+                <a16:creationId xmlns="" xmlns:a16="http://schemas.microsoft.com/office/drawing/2014/main" id="{6799EFD0-FF52-4DE6-868B-77F17D2F4FF0}"/>
               </a:ext>
             </a:extLst>
           </p:cNvPr>
@@ -336,7 +336,7 @@
     </p:spTree>
     <p:extLst>
       <p:ext uri="{BB962C8B-B14F-4D97-AF65-F5344CB8AC3E}">
-        <p14:creationId xmlns:p14="http://schemas.microsoft.com/office/powerpoint/2010/main" xmlns="" val="3630569971"/>
+        <p14:creationId xmlns="" xmlns:p14="http://schemas.microsoft.com/office/powerpoint/2010/main" val="3630569971"/>
       </p:ext>
     </p:extLst>
   </p:cSld>
@@ -368,7 +368,7 @@
           <p:cNvPr id="2" name="Título 1">
             <a:extLst>
               <a:ext uri="{FF2B5EF4-FFF2-40B4-BE49-F238E27FC236}">
-                <a16:creationId xmlns:a16="http://schemas.microsoft.com/office/drawing/2014/main" xmlns="" id="{0DC87140-B7D9-4FA4-A34F-FB77A3666A4F}"/>
+                <a16:creationId xmlns="" xmlns:a16="http://schemas.microsoft.com/office/drawing/2014/main" id="{0DC87140-B7D9-4FA4-A34F-FB77A3666A4F}"/>
               </a:ext>
             </a:extLst>
           </p:cNvPr>
@@ -396,7 +396,7 @@
           <p:cNvPr id="3" name="Marcador de texto vertical 2">
             <a:extLst>
               <a:ext uri="{FF2B5EF4-FFF2-40B4-BE49-F238E27FC236}">
-                <a16:creationId xmlns:a16="http://schemas.microsoft.com/office/drawing/2014/main" xmlns="" id="{850563DB-D0F8-4DBB-A77B-19BBDF9BDBCD}"/>
+                <a16:creationId xmlns="" xmlns:a16="http://schemas.microsoft.com/office/drawing/2014/main" id="{850563DB-D0F8-4DBB-A77B-19BBDF9BDBCD}"/>
               </a:ext>
             </a:extLst>
           </p:cNvPr>
@@ -453,7 +453,7 @@
           <p:cNvPr id="4" name="Marcador de fecha 3">
             <a:extLst>
               <a:ext uri="{FF2B5EF4-FFF2-40B4-BE49-F238E27FC236}">
-                <a16:creationId xmlns:a16="http://schemas.microsoft.com/office/drawing/2014/main" xmlns="" id="{F3F66AC4-DE53-4169-9771-B049F319EEA9}"/>
+                <a16:creationId xmlns="" xmlns:a16="http://schemas.microsoft.com/office/drawing/2014/main" id="{F3F66AC4-DE53-4169-9771-B049F319EEA9}"/>
               </a:ext>
             </a:extLst>
           </p:cNvPr>
@@ -472,7 +472,7 @@
             <a:fld id="{EFBC5A1B-75D9-4BC9-8C41-860857045191}" type="datetimeFigureOut">
               <a:rPr lang="es-ES" smtClean="0"/>
               <a:pPr/>
-              <a:t>10/12/2023</a:t>
+              <a:t>13/12/2023</a:t>
             </a:fld>
             <a:endParaRPr lang="es-ES"/>
           </a:p>
@@ -483,7 +483,7 @@
           <p:cNvPr id="5" name="Marcador de pie de página 4">
             <a:extLst>
               <a:ext uri="{FF2B5EF4-FFF2-40B4-BE49-F238E27FC236}">
-                <a16:creationId xmlns:a16="http://schemas.microsoft.com/office/drawing/2014/main" xmlns="" id="{7F1B4E51-E6DE-4608-865D-CC9B9B289FC7}"/>
+                <a16:creationId xmlns="" xmlns:a16="http://schemas.microsoft.com/office/drawing/2014/main" id="{7F1B4E51-E6DE-4608-865D-CC9B9B289FC7}"/>
               </a:ext>
             </a:extLst>
           </p:cNvPr>
@@ -508,7 +508,7 @@
           <p:cNvPr id="6" name="Marcador de número de diapositiva 5">
             <a:extLst>
               <a:ext uri="{FF2B5EF4-FFF2-40B4-BE49-F238E27FC236}">
-                <a16:creationId xmlns:a16="http://schemas.microsoft.com/office/drawing/2014/main" xmlns="" id="{AC49A7EA-BD2D-4D11-9E44-7FD8F2848414}"/>
+                <a16:creationId xmlns="" xmlns:a16="http://schemas.microsoft.com/office/drawing/2014/main" id="{AC49A7EA-BD2D-4D11-9E44-7FD8F2848414}"/>
               </a:ext>
             </a:extLst>
           </p:cNvPr>
@@ -536,7 +536,7 @@
     </p:spTree>
     <p:extLst>
       <p:ext uri="{BB962C8B-B14F-4D97-AF65-F5344CB8AC3E}">
-        <p14:creationId xmlns:p14="http://schemas.microsoft.com/office/powerpoint/2010/main" xmlns="" val="3667736171"/>
+        <p14:creationId xmlns="" xmlns:p14="http://schemas.microsoft.com/office/powerpoint/2010/main" val="3667736171"/>
       </p:ext>
     </p:extLst>
   </p:cSld>
@@ -568,7 +568,7 @@
           <p:cNvPr id="2" name="Título vertical 1">
             <a:extLst>
               <a:ext uri="{FF2B5EF4-FFF2-40B4-BE49-F238E27FC236}">
-                <a16:creationId xmlns:a16="http://schemas.microsoft.com/office/drawing/2014/main" xmlns="" id="{5B32CEA0-9850-4637-812E-6A3BA3FDCDE1}"/>
+                <a16:creationId xmlns="" xmlns:a16="http://schemas.microsoft.com/office/drawing/2014/main" id="{5B32CEA0-9850-4637-812E-6A3BA3FDCDE1}"/>
               </a:ext>
             </a:extLst>
           </p:cNvPr>
@@ -601,7 +601,7 @@
           <p:cNvPr id="3" name="Marcador de texto vertical 2">
             <a:extLst>
               <a:ext uri="{FF2B5EF4-FFF2-40B4-BE49-F238E27FC236}">
-                <a16:creationId xmlns:a16="http://schemas.microsoft.com/office/drawing/2014/main" xmlns="" id="{939BC441-ACB3-491E-BDDF-AAB44A6A9480}"/>
+                <a16:creationId xmlns="" xmlns:a16="http://schemas.microsoft.com/office/drawing/2014/main" id="{939BC441-ACB3-491E-BDDF-AAB44A6A9480}"/>
               </a:ext>
             </a:extLst>
           </p:cNvPr>
@@ -663,7 +663,7 @@
           <p:cNvPr id="4" name="Marcador de fecha 3">
             <a:extLst>
               <a:ext uri="{FF2B5EF4-FFF2-40B4-BE49-F238E27FC236}">
-                <a16:creationId xmlns:a16="http://schemas.microsoft.com/office/drawing/2014/main" xmlns="" id="{4E5F3364-5D05-4590-944A-B62A5881200D}"/>
+                <a16:creationId xmlns="" xmlns:a16="http://schemas.microsoft.com/office/drawing/2014/main" id="{4E5F3364-5D05-4590-944A-B62A5881200D}"/>
               </a:ext>
             </a:extLst>
           </p:cNvPr>
@@ -682,7 +682,7 @@
             <a:fld id="{EFBC5A1B-75D9-4BC9-8C41-860857045191}" type="datetimeFigureOut">
               <a:rPr lang="es-ES" smtClean="0"/>
               <a:pPr/>
-              <a:t>10/12/2023</a:t>
+              <a:t>13/12/2023</a:t>
             </a:fld>
             <a:endParaRPr lang="es-ES"/>
           </a:p>
@@ -693,7 +693,7 @@
           <p:cNvPr id="5" name="Marcador de pie de página 4">
             <a:extLst>
               <a:ext uri="{FF2B5EF4-FFF2-40B4-BE49-F238E27FC236}">
-                <a16:creationId xmlns:a16="http://schemas.microsoft.com/office/drawing/2014/main" xmlns="" id="{F6634A9D-820F-4C3B-AD07-AAB5383B1C30}"/>
+                <a16:creationId xmlns="" xmlns:a16="http://schemas.microsoft.com/office/drawing/2014/main" id="{F6634A9D-820F-4C3B-AD07-AAB5383B1C30}"/>
               </a:ext>
             </a:extLst>
           </p:cNvPr>
@@ -718,7 +718,7 @@
           <p:cNvPr id="6" name="Marcador de número de diapositiva 5">
             <a:extLst>
               <a:ext uri="{FF2B5EF4-FFF2-40B4-BE49-F238E27FC236}">
-                <a16:creationId xmlns:a16="http://schemas.microsoft.com/office/drawing/2014/main" xmlns="" id="{AF9F029D-3E88-4B7B-BB5B-24C24BC15CA7}"/>
+                <a16:creationId xmlns="" xmlns:a16="http://schemas.microsoft.com/office/drawing/2014/main" id="{AF9F029D-3E88-4B7B-BB5B-24C24BC15CA7}"/>
               </a:ext>
             </a:extLst>
           </p:cNvPr>
@@ -746,7 +746,7 @@
     </p:spTree>
     <p:extLst>
       <p:ext uri="{BB962C8B-B14F-4D97-AF65-F5344CB8AC3E}">
-        <p14:creationId xmlns:p14="http://schemas.microsoft.com/office/powerpoint/2010/main" xmlns="" val="3527137102"/>
+        <p14:creationId xmlns="" xmlns:p14="http://schemas.microsoft.com/office/powerpoint/2010/main" val="3527137102"/>
       </p:ext>
     </p:extLst>
   </p:cSld>
@@ -778,7 +778,7 @@
           <p:cNvPr id="2" name="Título 1">
             <a:extLst>
               <a:ext uri="{FF2B5EF4-FFF2-40B4-BE49-F238E27FC236}">
-                <a16:creationId xmlns:a16="http://schemas.microsoft.com/office/drawing/2014/main" xmlns="" id="{08950D71-BF45-4BBD-819C-49E969998269}"/>
+                <a16:creationId xmlns="" xmlns:a16="http://schemas.microsoft.com/office/drawing/2014/main" id="{08950D71-BF45-4BBD-819C-49E969998269}"/>
               </a:ext>
             </a:extLst>
           </p:cNvPr>
@@ -806,7 +806,7 @@
           <p:cNvPr id="3" name="Marcador de contenido 2">
             <a:extLst>
               <a:ext uri="{FF2B5EF4-FFF2-40B4-BE49-F238E27FC236}">
-                <a16:creationId xmlns:a16="http://schemas.microsoft.com/office/drawing/2014/main" xmlns="" id="{961FBA74-E944-406F-826A-2C37A64FD07F}"/>
+                <a16:creationId xmlns="" xmlns:a16="http://schemas.microsoft.com/office/drawing/2014/main" id="{961FBA74-E944-406F-826A-2C37A64FD07F}"/>
               </a:ext>
             </a:extLst>
           </p:cNvPr>
@@ -863,7 +863,7 @@
           <p:cNvPr id="4" name="Marcador de fecha 3">
             <a:extLst>
               <a:ext uri="{FF2B5EF4-FFF2-40B4-BE49-F238E27FC236}">
-                <a16:creationId xmlns:a16="http://schemas.microsoft.com/office/drawing/2014/main" xmlns="" id="{9BF5C59E-1E2B-45B4-9381-181FD109BDB3}"/>
+                <a16:creationId xmlns="" xmlns:a16="http://schemas.microsoft.com/office/drawing/2014/main" id="{9BF5C59E-1E2B-45B4-9381-181FD109BDB3}"/>
               </a:ext>
             </a:extLst>
           </p:cNvPr>
@@ -882,7 +882,7 @@
             <a:fld id="{EFBC5A1B-75D9-4BC9-8C41-860857045191}" type="datetimeFigureOut">
               <a:rPr lang="es-ES" smtClean="0"/>
               <a:pPr/>
-              <a:t>10/12/2023</a:t>
+              <a:t>13/12/2023</a:t>
             </a:fld>
             <a:endParaRPr lang="es-ES"/>
           </a:p>
@@ -893,7 +893,7 @@
           <p:cNvPr id="5" name="Marcador de pie de página 4">
             <a:extLst>
               <a:ext uri="{FF2B5EF4-FFF2-40B4-BE49-F238E27FC236}">
-                <a16:creationId xmlns:a16="http://schemas.microsoft.com/office/drawing/2014/main" xmlns="" id="{A837392A-47E5-47F6-8C55-2267B7EEB618}"/>
+                <a16:creationId xmlns="" xmlns:a16="http://schemas.microsoft.com/office/drawing/2014/main" id="{A837392A-47E5-47F6-8C55-2267B7EEB618}"/>
               </a:ext>
             </a:extLst>
           </p:cNvPr>
@@ -918,7 +918,7 @@
           <p:cNvPr id="6" name="Marcador de número de diapositiva 5">
             <a:extLst>
               <a:ext uri="{FF2B5EF4-FFF2-40B4-BE49-F238E27FC236}">
-                <a16:creationId xmlns:a16="http://schemas.microsoft.com/office/drawing/2014/main" xmlns="" id="{2DAD3A73-252F-438F-9D6E-BFF97E283E0E}"/>
+                <a16:creationId xmlns="" xmlns:a16="http://schemas.microsoft.com/office/drawing/2014/main" id="{2DAD3A73-252F-438F-9D6E-BFF97E283E0E}"/>
               </a:ext>
             </a:extLst>
           </p:cNvPr>
@@ -946,7 +946,7 @@
     </p:spTree>
     <p:extLst>
       <p:ext uri="{BB962C8B-B14F-4D97-AF65-F5344CB8AC3E}">
-        <p14:creationId xmlns:p14="http://schemas.microsoft.com/office/powerpoint/2010/main" xmlns="" val="3101532947"/>
+        <p14:creationId xmlns="" xmlns:p14="http://schemas.microsoft.com/office/powerpoint/2010/main" val="3101532947"/>
       </p:ext>
     </p:extLst>
   </p:cSld>
@@ -978,7 +978,7 @@
           <p:cNvPr id="2" name="Título 1">
             <a:extLst>
               <a:ext uri="{FF2B5EF4-FFF2-40B4-BE49-F238E27FC236}">
-                <a16:creationId xmlns:a16="http://schemas.microsoft.com/office/drawing/2014/main" xmlns="" id="{D95F49E8-9F51-4C29-B594-41EFB07B151D}"/>
+                <a16:creationId xmlns="" xmlns:a16="http://schemas.microsoft.com/office/drawing/2014/main" id="{D95F49E8-9F51-4C29-B594-41EFB07B151D}"/>
               </a:ext>
             </a:extLst>
           </p:cNvPr>
@@ -1015,7 +1015,7 @@
           <p:cNvPr id="3" name="Marcador de texto 2">
             <a:extLst>
               <a:ext uri="{FF2B5EF4-FFF2-40B4-BE49-F238E27FC236}">
-                <a16:creationId xmlns:a16="http://schemas.microsoft.com/office/drawing/2014/main" xmlns="" id="{14212A7B-BB3F-43D7-BB50-5C778BF31233}"/>
+                <a16:creationId xmlns="" xmlns:a16="http://schemas.microsoft.com/office/drawing/2014/main" id="{14212A7B-BB3F-43D7-BB50-5C778BF31233}"/>
               </a:ext>
             </a:extLst>
           </p:cNvPr>
@@ -1140,7 +1140,7 @@
           <p:cNvPr id="4" name="Marcador de fecha 3">
             <a:extLst>
               <a:ext uri="{FF2B5EF4-FFF2-40B4-BE49-F238E27FC236}">
-                <a16:creationId xmlns:a16="http://schemas.microsoft.com/office/drawing/2014/main" xmlns="" id="{4D1F1240-5664-43E2-A8B7-3D42989C6517}"/>
+                <a16:creationId xmlns="" xmlns:a16="http://schemas.microsoft.com/office/drawing/2014/main" id="{4D1F1240-5664-43E2-A8B7-3D42989C6517}"/>
               </a:ext>
             </a:extLst>
           </p:cNvPr>
@@ -1159,7 +1159,7 @@
             <a:fld id="{EFBC5A1B-75D9-4BC9-8C41-860857045191}" type="datetimeFigureOut">
               <a:rPr lang="es-ES" smtClean="0"/>
               <a:pPr/>
-              <a:t>10/12/2023</a:t>
+              <a:t>13/12/2023</a:t>
             </a:fld>
             <a:endParaRPr lang="es-ES"/>
           </a:p>
@@ -1170,7 +1170,7 @@
           <p:cNvPr id="5" name="Marcador de pie de página 4">
             <a:extLst>
               <a:ext uri="{FF2B5EF4-FFF2-40B4-BE49-F238E27FC236}">
-                <a16:creationId xmlns:a16="http://schemas.microsoft.com/office/drawing/2014/main" xmlns="" id="{92038497-9614-49CA-BFAB-997CB1B236C1}"/>
+                <a16:creationId xmlns="" xmlns:a16="http://schemas.microsoft.com/office/drawing/2014/main" id="{92038497-9614-49CA-BFAB-997CB1B236C1}"/>
               </a:ext>
             </a:extLst>
           </p:cNvPr>
@@ -1195,7 +1195,7 @@
           <p:cNvPr id="6" name="Marcador de número de diapositiva 5">
             <a:extLst>
               <a:ext uri="{FF2B5EF4-FFF2-40B4-BE49-F238E27FC236}">
-                <a16:creationId xmlns:a16="http://schemas.microsoft.com/office/drawing/2014/main" xmlns="" id="{833C8CA2-40EC-4045-B0F5-731AF8AEEFD1}"/>
+                <a16:creationId xmlns="" xmlns:a16="http://schemas.microsoft.com/office/drawing/2014/main" id="{833C8CA2-40EC-4045-B0F5-731AF8AEEFD1}"/>
               </a:ext>
             </a:extLst>
           </p:cNvPr>
@@ -1223,7 +1223,7 @@
     </p:spTree>
     <p:extLst>
       <p:ext uri="{BB962C8B-B14F-4D97-AF65-F5344CB8AC3E}">
-        <p14:creationId xmlns:p14="http://schemas.microsoft.com/office/powerpoint/2010/main" xmlns="" val="3711361680"/>
+        <p14:creationId xmlns="" xmlns:p14="http://schemas.microsoft.com/office/powerpoint/2010/main" val="3711361680"/>
       </p:ext>
     </p:extLst>
   </p:cSld>
@@ -1255,7 +1255,7 @@
           <p:cNvPr id="2" name="Título 1">
             <a:extLst>
               <a:ext uri="{FF2B5EF4-FFF2-40B4-BE49-F238E27FC236}">
-                <a16:creationId xmlns:a16="http://schemas.microsoft.com/office/drawing/2014/main" xmlns="" id="{41A6C47D-FD4D-4D43-801F-330700505E61}"/>
+                <a16:creationId xmlns="" xmlns:a16="http://schemas.microsoft.com/office/drawing/2014/main" id="{41A6C47D-FD4D-4D43-801F-330700505E61}"/>
               </a:ext>
             </a:extLst>
           </p:cNvPr>
@@ -1283,7 +1283,7 @@
           <p:cNvPr id="3" name="Marcador de contenido 2">
             <a:extLst>
               <a:ext uri="{FF2B5EF4-FFF2-40B4-BE49-F238E27FC236}">
-                <a16:creationId xmlns:a16="http://schemas.microsoft.com/office/drawing/2014/main" xmlns="" id="{D281C82E-1633-42E6-B5C4-E8BF7CD2F9B4}"/>
+                <a16:creationId xmlns="" xmlns:a16="http://schemas.microsoft.com/office/drawing/2014/main" id="{D281C82E-1633-42E6-B5C4-E8BF7CD2F9B4}"/>
               </a:ext>
             </a:extLst>
           </p:cNvPr>
@@ -1345,7 +1345,7 @@
           <p:cNvPr id="4" name="Marcador de contenido 3">
             <a:extLst>
               <a:ext uri="{FF2B5EF4-FFF2-40B4-BE49-F238E27FC236}">
-                <a16:creationId xmlns:a16="http://schemas.microsoft.com/office/drawing/2014/main" xmlns="" id="{BCA14AFC-7189-41E3-BA37-BCF1815CF68C}"/>
+                <a16:creationId xmlns="" xmlns:a16="http://schemas.microsoft.com/office/drawing/2014/main" id="{BCA14AFC-7189-41E3-BA37-BCF1815CF68C}"/>
               </a:ext>
             </a:extLst>
           </p:cNvPr>
@@ -1407,7 +1407,7 @@
           <p:cNvPr id="5" name="Marcador de fecha 4">
             <a:extLst>
               <a:ext uri="{FF2B5EF4-FFF2-40B4-BE49-F238E27FC236}">
-                <a16:creationId xmlns:a16="http://schemas.microsoft.com/office/drawing/2014/main" xmlns="" id="{C9ABDD57-5E98-4A92-91B4-6445F2830FC3}"/>
+                <a16:creationId xmlns="" xmlns:a16="http://schemas.microsoft.com/office/drawing/2014/main" id="{C9ABDD57-5E98-4A92-91B4-6445F2830FC3}"/>
               </a:ext>
             </a:extLst>
           </p:cNvPr>
@@ -1426,7 +1426,7 @@
             <a:fld id="{EFBC5A1B-75D9-4BC9-8C41-860857045191}" type="datetimeFigureOut">
               <a:rPr lang="es-ES" smtClean="0"/>
               <a:pPr/>
-              <a:t>10/12/2023</a:t>
+              <a:t>13/12/2023</a:t>
             </a:fld>
             <a:endParaRPr lang="es-ES"/>
           </a:p>
@@ -1437,7 +1437,7 @@
           <p:cNvPr id="6" name="Marcador de pie de página 5">
             <a:extLst>
               <a:ext uri="{FF2B5EF4-FFF2-40B4-BE49-F238E27FC236}">
-                <a16:creationId xmlns:a16="http://schemas.microsoft.com/office/drawing/2014/main" xmlns="" id="{8BE8DE0D-8FE7-404D-82FA-81005C035303}"/>
+                <a16:creationId xmlns="" xmlns:a16="http://schemas.microsoft.com/office/drawing/2014/main" id="{8BE8DE0D-8FE7-404D-82FA-81005C035303}"/>
               </a:ext>
             </a:extLst>
           </p:cNvPr>
@@ -1462,7 +1462,7 @@
           <p:cNvPr id="7" name="Marcador de número de diapositiva 6">
             <a:extLst>
               <a:ext uri="{FF2B5EF4-FFF2-40B4-BE49-F238E27FC236}">
-                <a16:creationId xmlns:a16="http://schemas.microsoft.com/office/drawing/2014/main" xmlns="" id="{D89226D1-4424-4713-8FA0-A7E883DDCC6D}"/>
+                <a16:creationId xmlns="" xmlns:a16="http://schemas.microsoft.com/office/drawing/2014/main" id="{D89226D1-4424-4713-8FA0-A7E883DDCC6D}"/>
               </a:ext>
             </a:extLst>
           </p:cNvPr>
@@ -1490,7 +1490,7 @@
     </p:spTree>
     <p:extLst>
       <p:ext uri="{BB962C8B-B14F-4D97-AF65-F5344CB8AC3E}">
-        <p14:creationId xmlns:p14="http://schemas.microsoft.com/office/powerpoint/2010/main" xmlns="" val="2478964046"/>
+        <p14:creationId xmlns="" xmlns:p14="http://schemas.microsoft.com/office/powerpoint/2010/main" val="2478964046"/>
       </p:ext>
     </p:extLst>
   </p:cSld>
@@ -1522,7 +1522,7 @@
           <p:cNvPr id="2" name="Título 1">
             <a:extLst>
               <a:ext uri="{FF2B5EF4-FFF2-40B4-BE49-F238E27FC236}">
-                <a16:creationId xmlns:a16="http://schemas.microsoft.com/office/drawing/2014/main" xmlns="" id="{202F9D12-A55E-498F-94E5-6AA1DDDCC6AA}"/>
+                <a16:creationId xmlns="" xmlns:a16="http://schemas.microsoft.com/office/drawing/2014/main" id="{202F9D12-A55E-498F-94E5-6AA1DDDCC6AA}"/>
               </a:ext>
             </a:extLst>
           </p:cNvPr>
@@ -1555,7 +1555,7 @@
           <p:cNvPr id="3" name="Marcador de texto 2">
             <a:extLst>
               <a:ext uri="{FF2B5EF4-FFF2-40B4-BE49-F238E27FC236}">
-                <a16:creationId xmlns:a16="http://schemas.microsoft.com/office/drawing/2014/main" xmlns="" id="{F45F8F00-0AAE-4BCC-ACE0-EF39A7855793}"/>
+                <a16:creationId xmlns="" xmlns:a16="http://schemas.microsoft.com/office/drawing/2014/main" id="{F45F8F00-0AAE-4BCC-ACE0-EF39A7855793}"/>
               </a:ext>
             </a:extLst>
           </p:cNvPr>
@@ -1626,7 +1626,7 @@
           <p:cNvPr id="4" name="Marcador de contenido 3">
             <a:extLst>
               <a:ext uri="{FF2B5EF4-FFF2-40B4-BE49-F238E27FC236}">
-                <a16:creationId xmlns:a16="http://schemas.microsoft.com/office/drawing/2014/main" xmlns="" id="{480D2540-C401-4457-A666-27A2FE07A1EB}"/>
+                <a16:creationId xmlns="" xmlns:a16="http://schemas.microsoft.com/office/drawing/2014/main" id="{480D2540-C401-4457-A666-27A2FE07A1EB}"/>
               </a:ext>
             </a:extLst>
           </p:cNvPr>
@@ -1688,7 +1688,7 @@
           <p:cNvPr id="5" name="Marcador de texto 4">
             <a:extLst>
               <a:ext uri="{FF2B5EF4-FFF2-40B4-BE49-F238E27FC236}">
-                <a16:creationId xmlns:a16="http://schemas.microsoft.com/office/drawing/2014/main" xmlns="" id="{162F695D-A642-46C8-A831-1B43A3621DC9}"/>
+                <a16:creationId xmlns="" xmlns:a16="http://schemas.microsoft.com/office/drawing/2014/main" id="{162F695D-A642-46C8-A831-1B43A3621DC9}"/>
               </a:ext>
             </a:extLst>
           </p:cNvPr>
@@ -1759,7 +1759,7 @@
           <p:cNvPr id="6" name="Marcador de contenido 5">
             <a:extLst>
               <a:ext uri="{FF2B5EF4-FFF2-40B4-BE49-F238E27FC236}">
-                <a16:creationId xmlns:a16="http://schemas.microsoft.com/office/drawing/2014/main" xmlns="" id="{28899A86-5725-455F-94EE-5587484C3ADA}"/>
+                <a16:creationId xmlns="" xmlns:a16="http://schemas.microsoft.com/office/drawing/2014/main" id="{28899A86-5725-455F-94EE-5587484C3ADA}"/>
               </a:ext>
             </a:extLst>
           </p:cNvPr>
@@ -1821,7 +1821,7 @@
           <p:cNvPr id="7" name="Marcador de fecha 6">
             <a:extLst>
               <a:ext uri="{FF2B5EF4-FFF2-40B4-BE49-F238E27FC236}">
-                <a16:creationId xmlns:a16="http://schemas.microsoft.com/office/drawing/2014/main" xmlns="" id="{71554A8D-DBE0-4421-9267-7776721E8BE7}"/>
+                <a16:creationId xmlns="" xmlns:a16="http://schemas.microsoft.com/office/drawing/2014/main" id="{71554A8D-DBE0-4421-9267-7776721E8BE7}"/>
               </a:ext>
             </a:extLst>
           </p:cNvPr>
@@ -1840,7 +1840,7 @@
             <a:fld id="{EFBC5A1B-75D9-4BC9-8C41-860857045191}" type="datetimeFigureOut">
               <a:rPr lang="es-ES" smtClean="0"/>
               <a:pPr/>
-              <a:t>10/12/2023</a:t>
+              <a:t>13/12/2023</a:t>
             </a:fld>
             <a:endParaRPr lang="es-ES"/>
           </a:p>
@@ -1851,7 +1851,7 @@
           <p:cNvPr id="8" name="Marcador de pie de página 7">
             <a:extLst>
               <a:ext uri="{FF2B5EF4-FFF2-40B4-BE49-F238E27FC236}">
-                <a16:creationId xmlns:a16="http://schemas.microsoft.com/office/drawing/2014/main" xmlns="" id="{71B657D1-4479-4DAA-A27D-75F0872E33AC}"/>
+                <a16:creationId xmlns="" xmlns:a16="http://schemas.microsoft.com/office/drawing/2014/main" id="{71B657D1-4479-4DAA-A27D-75F0872E33AC}"/>
               </a:ext>
             </a:extLst>
           </p:cNvPr>
@@ -1876,7 +1876,7 @@
           <p:cNvPr id="9" name="Marcador de número de diapositiva 8">
             <a:extLst>
               <a:ext uri="{FF2B5EF4-FFF2-40B4-BE49-F238E27FC236}">
-                <a16:creationId xmlns:a16="http://schemas.microsoft.com/office/drawing/2014/main" xmlns="" id="{72E44760-02D4-4C5D-83CF-6712A8290F9D}"/>
+                <a16:creationId xmlns="" xmlns:a16="http://schemas.microsoft.com/office/drawing/2014/main" id="{72E44760-02D4-4C5D-83CF-6712A8290F9D}"/>
               </a:ext>
             </a:extLst>
           </p:cNvPr>
@@ -1904,7 +1904,7 @@
     </p:spTree>
     <p:extLst>
       <p:ext uri="{BB962C8B-B14F-4D97-AF65-F5344CB8AC3E}">
-        <p14:creationId xmlns:p14="http://schemas.microsoft.com/office/powerpoint/2010/main" xmlns="" val="4187433897"/>
+        <p14:creationId xmlns="" xmlns:p14="http://schemas.microsoft.com/office/powerpoint/2010/main" val="4187433897"/>
       </p:ext>
     </p:extLst>
   </p:cSld>
@@ -1936,7 +1936,7 @@
           <p:cNvPr id="2" name="Título 1">
             <a:extLst>
               <a:ext uri="{FF2B5EF4-FFF2-40B4-BE49-F238E27FC236}">
-                <a16:creationId xmlns:a16="http://schemas.microsoft.com/office/drawing/2014/main" xmlns="" id="{6270498C-939A-497C-AF25-022EDE14FDF4}"/>
+                <a16:creationId xmlns="" xmlns:a16="http://schemas.microsoft.com/office/drawing/2014/main" id="{6270498C-939A-497C-AF25-022EDE14FDF4}"/>
               </a:ext>
             </a:extLst>
           </p:cNvPr>
@@ -1964,7 +1964,7 @@
           <p:cNvPr id="3" name="Marcador de fecha 2">
             <a:extLst>
               <a:ext uri="{FF2B5EF4-FFF2-40B4-BE49-F238E27FC236}">
-                <a16:creationId xmlns:a16="http://schemas.microsoft.com/office/drawing/2014/main" xmlns="" id="{38BD6F06-A827-4D38-A1D9-D7BF5373DAD4}"/>
+                <a16:creationId xmlns="" xmlns:a16="http://schemas.microsoft.com/office/drawing/2014/main" id="{38BD6F06-A827-4D38-A1D9-D7BF5373DAD4}"/>
               </a:ext>
             </a:extLst>
           </p:cNvPr>
@@ -1983,7 +1983,7 @@
             <a:fld id="{EFBC5A1B-75D9-4BC9-8C41-860857045191}" type="datetimeFigureOut">
               <a:rPr lang="es-ES" smtClean="0"/>
               <a:pPr/>
-              <a:t>10/12/2023</a:t>
+              <a:t>13/12/2023</a:t>
             </a:fld>
             <a:endParaRPr lang="es-ES"/>
           </a:p>
@@ -1994,7 +1994,7 @@
           <p:cNvPr id="4" name="Marcador de pie de página 3">
             <a:extLst>
               <a:ext uri="{FF2B5EF4-FFF2-40B4-BE49-F238E27FC236}">
-                <a16:creationId xmlns:a16="http://schemas.microsoft.com/office/drawing/2014/main" xmlns="" id="{3F2DAFBA-2A4E-4070-8FD2-B6A0C9CD462C}"/>
+                <a16:creationId xmlns="" xmlns:a16="http://schemas.microsoft.com/office/drawing/2014/main" id="{3F2DAFBA-2A4E-4070-8FD2-B6A0C9CD462C}"/>
               </a:ext>
             </a:extLst>
           </p:cNvPr>
@@ -2019,7 +2019,7 @@
           <p:cNvPr id="5" name="Marcador de número de diapositiva 4">
             <a:extLst>
               <a:ext uri="{FF2B5EF4-FFF2-40B4-BE49-F238E27FC236}">
-                <a16:creationId xmlns:a16="http://schemas.microsoft.com/office/drawing/2014/main" xmlns="" id="{E3299BBA-08D4-4CE8-8C03-024C7A0AB49C}"/>
+                <a16:creationId xmlns="" xmlns:a16="http://schemas.microsoft.com/office/drawing/2014/main" id="{E3299BBA-08D4-4CE8-8C03-024C7A0AB49C}"/>
               </a:ext>
             </a:extLst>
           </p:cNvPr>
@@ -2047,7 +2047,7 @@
     </p:spTree>
     <p:extLst>
       <p:ext uri="{BB962C8B-B14F-4D97-AF65-F5344CB8AC3E}">
-        <p14:creationId xmlns:p14="http://schemas.microsoft.com/office/powerpoint/2010/main" xmlns="" val="1211332172"/>
+        <p14:creationId xmlns="" xmlns:p14="http://schemas.microsoft.com/office/powerpoint/2010/main" val="1211332172"/>
       </p:ext>
     </p:extLst>
   </p:cSld>
@@ -2079,7 +2079,7 @@
           <p:cNvPr id="2" name="Marcador de fecha 1">
             <a:extLst>
               <a:ext uri="{FF2B5EF4-FFF2-40B4-BE49-F238E27FC236}">
-                <a16:creationId xmlns:a16="http://schemas.microsoft.com/office/drawing/2014/main" xmlns="" id="{B2784211-5E54-4766-8B46-12C57FCBC2B6}"/>
+                <a16:creationId xmlns="" xmlns:a16="http://schemas.microsoft.com/office/drawing/2014/main" id="{B2784211-5E54-4766-8B46-12C57FCBC2B6}"/>
               </a:ext>
             </a:extLst>
           </p:cNvPr>
@@ -2098,7 +2098,7 @@
             <a:fld id="{EFBC5A1B-75D9-4BC9-8C41-860857045191}" type="datetimeFigureOut">
               <a:rPr lang="es-ES" smtClean="0"/>
               <a:pPr/>
-              <a:t>10/12/2023</a:t>
+              <a:t>13/12/2023</a:t>
             </a:fld>
             <a:endParaRPr lang="es-ES"/>
           </a:p>
@@ -2109,7 +2109,7 @@
           <p:cNvPr id="3" name="Marcador de pie de página 2">
             <a:extLst>
               <a:ext uri="{FF2B5EF4-FFF2-40B4-BE49-F238E27FC236}">
-                <a16:creationId xmlns:a16="http://schemas.microsoft.com/office/drawing/2014/main" xmlns="" id="{92520B57-CC9A-4071-8120-E857E89EDEB8}"/>
+                <a16:creationId xmlns="" xmlns:a16="http://schemas.microsoft.com/office/drawing/2014/main" id="{92520B57-CC9A-4071-8120-E857E89EDEB8}"/>
               </a:ext>
             </a:extLst>
           </p:cNvPr>
@@ -2134,7 +2134,7 @@
           <p:cNvPr id="4" name="Marcador de número de diapositiva 3">
             <a:extLst>
               <a:ext uri="{FF2B5EF4-FFF2-40B4-BE49-F238E27FC236}">
-                <a16:creationId xmlns:a16="http://schemas.microsoft.com/office/drawing/2014/main" xmlns="" id="{8787466D-3F3F-4F9A-B628-C2FA36CE4FE2}"/>
+                <a16:creationId xmlns="" xmlns:a16="http://schemas.microsoft.com/office/drawing/2014/main" id="{8787466D-3F3F-4F9A-B628-C2FA36CE4FE2}"/>
               </a:ext>
             </a:extLst>
           </p:cNvPr>
@@ -2162,7 +2162,7 @@
     </p:spTree>
     <p:extLst>
       <p:ext uri="{BB962C8B-B14F-4D97-AF65-F5344CB8AC3E}">
-        <p14:creationId xmlns:p14="http://schemas.microsoft.com/office/powerpoint/2010/main" xmlns="" val="2413498818"/>
+        <p14:creationId xmlns="" xmlns:p14="http://schemas.microsoft.com/office/powerpoint/2010/main" val="2413498818"/>
       </p:ext>
     </p:extLst>
   </p:cSld>
@@ -2194,7 +2194,7 @@
           <p:cNvPr id="2" name="Título 1">
             <a:extLst>
               <a:ext uri="{FF2B5EF4-FFF2-40B4-BE49-F238E27FC236}">
-                <a16:creationId xmlns:a16="http://schemas.microsoft.com/office/drawing/2014/main" xmlns="" id="{44E3FDF0-D5CD-4C55-83E1-A554A3F3F591}"/>
+                <a16:creationId xmlns="" xmlns:a16="http://schemas.microsoft.com/office/drawing/2014/main" id="{44E3FDF0-D5CD-4C55-83E1-A554A3F3F591}"/>
               </a:ext>
             </a:extLst>
           </p:cNvPr>
@@ -2231,7 +2231,7 @@
           <p:cNvPr id="3" name="Marcador de contenido 2">
             <a:extLst>
               <a:ext uri="{FF2B5EF4-FFF2-40B4-BE49-F238E27FC236}">
-                <a16:creationId xmlns:a16="http://schemas.microsoft.com/office/drawing/2014/main" xmlns="" id="{69135358-973E-4F29-858A-4C75727043F6}"/>
+                <a16:creationId xmlns="" xmlns:a16="http://schemas.microsoft.com/office/drawing/2014/main" id="{69135358-973E-4F29-858A-4C75727043F6}"/>
               </a:ext>
             </a:extLst>
           </p:cNvPr>
@@ -2321,7 +2321,7 @@
           <p:cNvPr id="4" name="Marcador de texto 3">
             <a:extLst>
               <a:ext uri="{FF2B5EF4-FFF2-40B4-BE49-F238E27FC236}">
-                <a16:creationId xmlns:a16="http://schemas.microsoft.com/office/drawing/2014/main" xmlns="" id="{F1FA2661-0462-4433-90DC-A12960285CEA}"/>
+                <a16:creationId xmlns="" xmlns:a16="http://schemas.microsoft.com/office/drawing/2014/main" id="{F1FA2661-0462-4433-90DC-A12960285CEA}"/>
               </a:ext>
             </a:extLst>
           </p:cNvPr>
@@ -2392,7 +2392,7 @@
           <p:cNvPr id="5" name="Marcador de fecha 4">
             <a:extLst>
               <a:ext uri="{FF2B5EF4-FFF2-40B4-BE49-F238E27FC236}">
-                <a16:creationId xmlns:a16="http://schemas.microsoft.com/office/drawing/2014/main" xmlns="" id="{49AD787B-F459-4052-B553-CF5A494DB782}"/>
+                <a16:creationId xmlns="" xmlns:a16="http://schemas.microsoft.com/office/drawing/2014/main" id="{49AD787B-F459-4052-B553-CF5A494DB782}"/>
               </a:ext>
             </a:extLst>
           </p:cNvPr>
@@ -2411,7 +2411,7 @@
             <a:fld id="{EFBC5A1B-75D9-4BC9-8C41-860857045191}" type="datetimeFigureOut">
               <a:rPr lang="es-ES" smtClean="0"/>
               <a:pPr/>
-              <a:t>10/12/2023</a:t>
+              <a:t>13/12/2023</a:t>
             </a:fld>
             <a:endParaRPr lang="es-ES"/>
           </a:p>
@@ -2422,7 +2422,7 @@
           <p:cNvPr id="6" name="Marcador de pie de página 5">
             <a:extLst>
               <a:ext uri="{FF2B5EF4-FFF2-40B4-BE49-F238E27FC236}">
-                <a16:creationId xmlns:a16="http://schemas.microsoft.com/office/drawing/2014/main" xmlns="" id="{382BE518-0B2A-4A03-AACE-B9DE17D076CB}"/>
+                <a16:creationId xmlns="" xmlns:a16="http://schemas.microsoft.com/office/drawing/2014/main" id="{382BE518-0B2A-4A03-AACE-B9DE17D076CB}"/>
               </a:ext>
             </a:extLst>
           </p:cNvPr>
@@ -2447,7 +2447,7 @@
           <p:cNvPr id="7" name="Marcador de número de diapositiva 6">
             <a:extLst>
               <a:ext uri="{FF2B5EF4-FFF2-40B4-BE49-F238E27FC236}">
-                <a16:creationId xmlns:a16="http://schemas.microsoft.com/office/drawing/2014/main" xmlns="" id="{3A808C19-9692-46CC-B81D-3AB421594BFD}"/>
+                <a16:creationId xmlns="" xmlns:a16="http://schemas.microsoft.com/office/drawing/2014/main" id="{3A808C19-9692-46CC-B81D-3AB421594BFD}"/>
               </a:ext>
             </a:extLst>
           </p:cNvPr>
@@ -2475,7 +2475,7 @@
     </p:spTree>
     <p:extLst>
       <p:ext uri="{BB962C8B-B14F-4D97-AF65-F5344CB8AC3E}">
-        <p14:creationId xmlns:p14="http://schemas.microsoft.com/office/powerpoint/2010/main" xmlns="" val="1899574245"/>
+        <p14:creationId xmlns="" xmlns:p14="http://schemas.microsoft.com/office/powerpoint/2010/main" val="1899574245"/>
       </p:ext>
     </p:extLst>
   </p:cSld>
@@ -2507,7 +2507,7 @@
           <p:cNvPr id="2" name="Título 1">
             <a:extLst>
               <a:ext uri="{FF2B5EF4-FFF2-40B4-BE49-F238E27FC236}">
-                <a16:creationId xmlns:a16="http://schemas.microsoft.com/office/drawing/2014/main" xmlns="" id="{5AD62FD5-B09C-4A87-8537-735604610918}"/>
+                <a16:creationId xmlns="" xmlns:a16="http://schemas.microsoft.com/office/drawing/2014/main" id="{5AD62FD5-B09C-4A87-8537-735604610918}"/>
               </a:ext>
             </a:extLst>
           </p:cNvPr>
@@ -2544,7 +2544,7 @@
           <p:cNvPr id="3" name="Marcador de posición de imagen 2">
             <a:extLst>
               <a:ext uri="{FF2B5EF4-FFF2-40B4-BE49-F238E27FC236}">
-                <a16:creationId xmlns:a16="http://schemas.microsoft.com/office/drawing/2014/main" xmlns="" id="{B3D90944-8F4E-47BC-BD69-8E893730E0D2}"/>
+                <a16:creationId xmlns="" xmlns:a16="http://schemas.microsoft.com/office/drawing/2014/main" id="{B3D90944-8F4E-47BC-BD69-8E893730E0D2}"/>
               </a:ext>
             </a:extLst>
           </p:cNvPr>
@@ -2611,7 +2611,7 @@
           <p:cNvPr id="4" name="Marcador de texto 3">
             <a:extLst>
               <a:ext uri="{FF2B5EF4-FFF2-40B4-BE49-F238E27FC236}">
-                <a16:creationId xmlns:a16="http://schemas.microsoft.com/office/drawing/2014/main" xmlns="" id="{094847E1-7783-460E-A2B7-D41F0DC2755F}"/>
+                <a16:creationId xmlns="" xmlns:a16="http://schemas.microsoft.com/office/drawing/2014/main" id="{094847E1-7783-460E-A2B7-D41F0DC2755F}"/>
               </a:ext>
             </a:extLst>
           </p:cNvPr>
@@ -2682,7 +2682,7 @@
           <p:cNvPr id="5" name="Marcador de fecha 4">
             <a:extLst>
               <a:ext uri="{FF2B5EF4-FFF2-40B4-BE49-F238E27FC236}">
-                <a16:creationId xmlns:a16="http://schemas.microsoft.com/office/drawing/2014/main" xmlns="" id="{28A8DEFC-7F7E-47C5-85E7-E75878DFD550}"/>
+                <a16:creationId xmlns="" xmlns:a16="http://schemas.microsoft.com/office/drawing/2014/main" id="{28A8DEFC-7F7E-47C5-85E7-E75878DFD550}"/>
               </a:ext>
             </a:extLst>
           </p:cNvPr>
@@ -2701,7 +2701,7 @@
             <a:fld id="{EFBC5A1B-75D9-4BC9-8C41-860857045191}" type="datetimeFigureOut">
               <a:rPr lang="es-ES" smtClean="0"/>
               <a:pPr/>
-              <a:t>10/12/2023</a:t>
+              <a:t>13/12/2023</a:t>
             </a:fld>
             <a:endParaRPr lang="es-ES"/>
           </a:p>
@@ -2712,7 +2712,7 @@
           <p:cNvPr id="6" name="Marcador de pie de página 5">
             <a:extLst>
               <a:ext uri="{FF2B5EF4-FFF2-40B4-BE49-F238E27FC236}">
-                <a16:creationId xmlns:a16="http://schemas.microsoft.com/office/drawing/2014/main" xmlns="" id="{6108570B-8B55-4DD4-ADE5-4F45C0073E55}"/>
+                <a16:creationId xmlns="" xmlns:a16="http://schemas.microsoft.com/office/drawing/2014/main" id="{6108570B-8B55-4DD4-ADE5-4F45C0073E55}"/>
               </a:ext>
             </a:extLst>
           </p:cNvPr>
@@ -2737,7 +2737,7 @@
           <p:cNvPr id="7" name="Marcador de número de diapositiva 6">
             <a:extLst>
               <a:ext uri="{FF2B5EF4-FFF2-40B4-BE49-F238E27FC236}">
-                <a16:creationId xmlns:a16="http://schemas.microsoft.com/office/drawing/2014/main" xmlns="" id="{46E94416-1E50-4C95-B4AF-F8B12D885D43}"/>
+                <a16:creationId xmlns="" xmlns:a16="http://schemas.microsoft.com/office/drawing/2014/main" id="{46E94416-1E50-4C95-B4AF-F8B12D885D43}"/>
               </a:ext>
             </a:extLst>
           </p:cNvPr>
@@ -2765,7 +2765,7 @@
     </p:spTree>
     <p:extLst>
       <p:ext uri="{BB962C8B-B14F-4D97-AF65-F5344CB8AC3E}">
-        <p14:creationId xmlns:p14="http://schemas.microsoft.com/office/powerpoint/2010/main" xmlns="" val="1689888809"/>
+        <p14:creationId xmlns="" xmlns:p14="http://schemas.microsoft.com/office/powerpoint/2010/main" val="1689888809"/>
       </p:ext>
     </p:extLst>
   </p:cSld>
@@ -2802,7 +2802,7 @@
           <p:cNvPr id="2" name="Marcador de título 1">
             <a:extLst>
               <a:ext uri="{FF2B5EF4-FFF2-40B4-BE49-F238E27FC236}">
-                <a16:creationId xmlns:a16="http://schemas.microsoft.com/office/drawing/2014/main" xmlns="" id="{1C4EA66B-8008-4E62-B470-D012372D9C54}"/>
+                <a16:creationId xmlns="" xmlns:a16="http://schemas.microsoft.com/office/drawing/2014/main" id="{1C4EA66B-8008-4E62-B470-D012372D9C54}"/>
               </a:ext>
             </a:extLst>
           </p:cNvPr>
@@ -2840,7 +2840,7 @@
           <p:cNvPr id="3" name="Marcador de texto 2">
             <a:extLst>
               <a:ext uri="{FF2B5EF4-FFF2-40B4-BE49-F238E27FC236}">
-                <a16:creationId xmlns:a16="http://schemas.microsoft.com/office/drawing/2014/main" xmlns="" id="{932AAA69-39C0-42B4-B0CB-603BEA360F90}"/>
+                <a16:creationId xmlns="" xmlns:a16="http://schemas.microsoft.com/office/drawing/2014/main" id="{932AAA69-39C0-42B4-B0CB-603BEA360F90}"/>
               </a:ext>
             </a:extLst>
           </p:cNvPr>
@@ -2907,7 +2907,7 @@
           <p:cNvPr id="4" name="Marcador de fecha 3">
             <a:extLst>
               <a:ext uri="{FF2B5EF4-FFF2-40B4-BE49-F238E27FC236}">
-                <a16:creationId xmlns:a16="http://schemas.microsoft.com/office/drawing/2014/main" xmlns="" id="{336B4845-2F33-4E2B-820D-DFDA0715031A}"/>
+                <a16:creationId xmlns="" xmlns:a16="http://schemas.microsoft.com/office/drawing/2014/main" id="{336B4845-2F33-4E2B-820D-DFDA0715031A}"/>
               </a:ext>
             </a:extLst>
           </p:cNvPr>
@@ -2944,7 +2944,7 @@
             <a:fld id="{EFBC5A1B-75D9-4BC9-8C41-860857045191}" type="datetimeFigureOut">
               <a:rPr lang="es-ES" smtClean="0"/>
               <a:pPr/>
-              <a:t>10/12/2023</a:t>
+              <a:t>13/12/2023</a:t>
             </a:fld>
             <a:endParaRPr lang="es-ES"/>
           </a:p>
@@ -2955,7 +2955,7 @@
           <p:cNvPr id="5" name="Marcador de pie de página 4">
             <a:extLst>
               <a:ext uri="{FF2B5EF4-FFF2-40B4-BE49-F238E27FC236}">
-                <a16:creationId xmlns:a16="http://schemas.microsoft.com/office/drawing/2014/main" xmlns="" id="{2377ABD5-FE97-43F4-9196-F24C9B97CADB}"/>
+                <a16:creationId xmlns="" xmlns:a16="http://schemas.microsoft.com/office/drawing/2014/main" id="{2377ABD5-FE97-43F4-9196-F24C9B97CADB}"/>
               </a:ext>
             </a:extLst>
           </p:cNvPr>
@@ -2998,7 +2998,7 @@
           <p:cNvPr id="6" name="Marcador de número de diapositiva 5">
             <a:extLst>
               <a:ext uri="{FF2B5EF4-FFF2-40B4-BE49-F238E27FC236}">
-                <a16:creationId xmlns:a16="http://schemas.microsoft.com/office/drawing/2014/main" xmlns="" id="{A20E76EC-D35B-45EB-B53D-F96C980103A1}"/>
+                <a16:creationId xmlns="" xmlns:a16="http://schemas.microsoft.com/office/drawing/2014/main" id="{A20E76EC-D35B-45EB-B53D-F96C980103A1}"/>
               </a:ext>
             </a:extLst>
           </p:cNvPr>
@@ -3044,7 +3044,7 @@
     </p:spTree>
     <p:extLst>
       <p:ext uri="{BB962C8B-B14F-4D97-AF65-F5344CB8AC3E}">
-        <p14:creationId xmlns:p14="http://schemas.microsoft.com/office/powerpoint/2010/main" xmlns="" val="3258147845"/>
+        <p14:creationId xmlns="" xmlns:p14="http://schemas.microsoft.com/office/powerpoint/2010/main" val="3258147845"/>
       </p:ext>
     </p:extLst>
   </p:cSld>
@@ -3486,10 +3486,7 @@
             </a:avLst>
           </a:prstGeom>
           <a:solidFill>
-            <a:schemeClr val="accent5">
-              <a:lumMod val="60000"/>
-              <a:lumOff val="40000"/>
-            </a:schemeClr>
+            <a:srgbClr val="B7DBFF"/>
           </a:solidFill>
           <a:ln w="19050">
             <a:solidFill>
@@ -3599,10 +3596,7 @@
             </a:avLst>
           </a:prstGeom>
           <a:solidFill>
-            <a:schemeClr val="accent5">
-              <a:lumMod val="60000"/>
-              <a:lumOff val="40000"/>
-            </a:schemeClr>
+            <a:srgbClr val="B7DBFF"/>
           </a:solidFill>
           <a:ln w="19050">
             <a:solidFill>
@@ -3655,10 +3649,7 @@
             </a:avLst>
           </a:prstGeom>
           <a:solidFill>
-            <a:schemeClr val="accent5">
-              <a:lumMod val="60000"/>
-              <a:lumOff val="40000"/>
-            </a:schemeClr>
+            <a:srgbClr val="B7DBFF"/>
           </a:solidFill>
           <a:ln w="19050">
             <a:solidFill>
@@ -3711,10 +3702,7 @@
             </a:avLst>
           </a:prstGeom>
           <a:solidFill>
-            <a:schemeClr val="accent5">
-              <a:lumMod val="60000"/>
-              <a:lumOff val="40000"/>
-            </a:schemeClr>
+            <a:srgbClr val="B7DBFF"/>
           </a:solidFill>
           <a:ln w="19050">
             <a:solidFill>
@@ -3767,10 +3755,7 @@
             </a:avLst>
           </a:prstGeom>
           <a:solidFill>
-            <a:schemeClr val="accent5">
-              <a:lumMod val="60000"/>
-              <a:lumOff val="40000"/>
-            </a:schemeClr>
+            <a:srgbClr val="B7DBFF"/>
           </a:solidFill>
           <a:ln w="19050">
             <a:solidFill>
@@ -3823,10 +3808,7 @@
             </a:avLst>
           </a:prstGeom>
           <a:solidFill>
-            <a:schemeClr val="accent5">
-              <a:lumMod val="60000"/>
-              <a:lumOff val="40000"/>
-            </a:schemeClr>
+            <a:srgbClr val="B7DBFF"/>
           </a:solidFill>
           <a:ln w="19050">
             <a:solidFill>
@@ -3911,8 +3893,8 @@
           </a:prstGeom>
           <a:solidFill>
             <a:schemeClr val="accent5">
-              <a:lumMod val="60000"/>
-              <a:lumOff val="40000"/>
+              <a:lumMod val="40000"/>
+              <a:lumOff val="60000"/>
             </a:schemeClr>
           </a:solidFill>
           <a:ln w="19050">
@@ -4001,11 +3983,7 @@
             </a:r>
             <a:r>
               <a:rPr lang="es-ES" sz="1400" smtClean="0"/>
-              <a:t>registros no </a:t>
-            </a:r>
-            <a:r>
-              <a:rPr lang="es-ES" sz="1400" smtClean="0"/>
-              <a:t>accesibles</a:t>
+              <a:t>registros no accesibles</a:t>
             </a:r>
             <a:endParaRPr lang="es-ES" sz="1400"/>
           </a:p>
@@ -4194,8 +4172,8 @@
           </a:prstGeom>
           <a:solidFill>
             <a:schemeClr val="accent5">
-              <a:lumMod val="60000"/>
-              <a:lumOff val="40000"/>
+              <a:lumMod val="40000"/>
+              <a:lumOff val="60000"/>
             </a:schemeClr>
           </a:solidFill>
           <a:ln w="19050">
@@ -4251,8 +4229,8 @@
           </a:prstGeom>
           <a:solidFill>
             <a:schemeClr val="accent5">
-              <a:lumMod val="60000"/>
-              <a:lumOff val="40000"/>
+              <a:lumMod val="40000"/>
+              <a:lumOff val="60000"/>
             </a:schemeClr>
           </a:solidFill>
           <a:ln w="19050">
@@ -4307,10 +4285,7 @@
             </a:avLst>
           </a:prstGeom>
           <a:solidFill>
-            <a:schemeClr val="accent5">
-              <a:lumMod val="60000"/>
-              <a:lumOff val="40000"/>
-            </a:schemeClr>
+            <a:srgbClr val="B7DBFF"/>
           </a:solidFill>
           <a:ln w="19050">
             <a:solidFill>
@@ -4363,10 +4338,7 @@
             </a:avLst>
           </a:prstGeom>
           <a:solidFill>
-            <a:schemeClr val="accent5">
-              <a:lumMod val="60000"/>
-              <a:lumOff val="40000"/>
-            </a:schemeClr>
+            <a:srgbClr val="B7DBFF"/>
           </a:solidFill>
           <a:ln w="19050">
             <a:solidFill>
@@ -4419,10 +4391,7 @@
             </a:avLst>
           </a:prstGeom>
           <a:solidFill>
-            <a:schemeClr val="accent5">
-              <a:lumMod val="60000"/>
-              <a:lumOff val="40000"/>
-            </a:schemeClr>
+            <a:srgbClr val="B7DBFF"/>
           </a:solidFill>
           <a:ln w="19050">
             <a:solidFill>
@@ -4475,10 +4444,7 @@
             </a:avLst>
           </a:prstGeom>
           <a:solidFill>
-            <a:schemeClr val="accent5">
-              <a:lumMod val="60000"/>
-              <a:lumOff val="40000"/>
-            </a:schemeClr>
+            <a:srgbClr val="B7DBFF"/>
           </a:solidFill>
           <a:ln w="19050">
             <a:solidFill>
@@ -4531,10 +4497,7 @@
             </a:avLst>
           </a:prstGeom>
           <a:solidFill>
-            <a:schemeClr val="accent5">
-              <a:lumMod val="60000"/>
-              <a:lumOff val="40000"/>
-            </a:schemeClr>
+            <a:srgbClr val="B7DBFF"/>
           </a:solidFill>
           <a:ln w="19050">
             <a:solidFill>
@@ -4587,10 +4550,7 @@
             </a:avLst>
           </a:prstGeom>
           <a:solidFill>
-            <a:schemeClr val="accent5">
-              <a:lumMod val="60000"/>
-              <a:lumOff val="40000"/>
-            </a:schemeClr>
+            <a:srgbClr val="B7DBFF"/>
           </a:solidFill>
           <a:ln w="19050">
             <a:solidFill>
@@ -4643,10 +4603,7 @@
             </a:avLst>
           </a:prstGeom>
           <a:solidFill>
-            <a:schemeClr val="accent5">
-              <a:lumMod val="60000"/>
-              <a:lumOff val="40000"/>
-            </a:schemeClr>
+            <a:srgbClr val="B7DBFF"/>
           </a:solidFill>
           <a:ln w="19050">
             <a:solidFill>
@@ -4699,10 +4656,7 @@
             </a:avLst>
           </a:prstGeom>
           <a:solidFill>
-            <a:schemeClr val="accent5">
-              <a:lumMod val="60000"/>
-              <a:lumOff val="40000"/>
-            </a:schemeClr>
+            <a:srgbClr val="B7DBFF"/>
           </a:solidFill>
           <a:ln w="19050">
             <a:solidFill>
@@ -4755,10 +4709,7 @@
             </a:avLst>
           </a:prstGeom>
           <a:solidFill>
-            <a:schemeClr val="accent5">
-              <a:lumMod val="60000"/>
-              <a:lumOff val="40000"/>
-            </a:schemeClr>
+            <a:srgbClr val="B7DBFF"/>
           </a:solidFill>
           <a:ln w="19050">
             <a:solidFill>
@@ -4811,10 +4762,7 @@
             </a:avLst>
           </a:prstGeom>
           <a:solidFill>
-            <a:schemeClr val="accent5">
-              <a:lumMod val="60000"/>
-              <a:lumOff val="40000"/>
-            </a:schemeClr>
+            <a:srgbClr val="B7DBFF"/>
           </a:solidFill>
           <a:ln w="19050">
             <a:solidFill>
@@ -5388,7 +5336,7 @@
     </p:spTree>
     <p:extLst>
       <p:ext uri="{BB962C8B-B14F-4D97-AF65-F5344CB8AC3E}">
-        <p14:creationId xmlns:p14="http://schemas.microsoft.com/office/powerpoint/2010/main" xmlns="" val="3578574719"/>
+        <p14:creationId xmlns="" xmlns:p14="http://schemas.microsoft.com/office/powerpoint/2010/main" val="3578574719"/>
       </p:ext>
     </p:extLst>
   </p:cSld>
@@ -5515,7 +5463,7 @@
           <p:cNvPr id="5" name="20 Rectángulo redondeado">
             <a:extLst>
               <a:ext uri="{FF2B5EF4-FFF2-40B4-BE49-F238E27FC236}">
-                <a16:creationId xmlns="" xmlns:a16="http://schemas.microsoft.com/office/drawing/2014/main" id="{BDAB4561-544B-4F79-B04B-FEFA48E22BFB}"/>
+                <a16:creationId xmlns:a16="http://schemas.microsoft.com/office/drawing/2014/main" xmlns="" id="{BDAB4561-544B-4F79-B04B-FEFA48E22BFB}"/>
               </a:ext>
             </a:extLst>
           </p:cNvPr>
@@ -5576,7 +5524,7 @@
           <p:cNvPr id="6" name="16 Decisión">
             <a:extLst>
               <a:ext uri="{FF2B5EF4-FFF2-40B4-BE49-F238E27FC236}">
-                <a16:creationId xmlns="" xmlns:a16="http://schemas.microsoft.com/office/drawing/2014/main" id="{FD2C65EB-311B-4CBC-A411-E81D45AF1666}"/>
+                <a16:creationId xmlns:a16="http://schemas.microsoft.com/office/drawing/2014/main" xmlns="" id="{FD2C65EB-311B-4CBC-A411-E81D45AF1666}"/>
               </a:ext>
             </a:extLst>
           </p:cNvPr>
@@ -5634,7 +5582,7 @@
           <p:cNvPr id="7" name="29 Conector recto de flecha">
             <a:extLst>
               <a:ext uri="{FF2B5EF4-FFF2-40B4-BE49-F238E27FC236}">
-                <a16:creationId xmlns="" xmlns:a16="http://schemas.microsoft.com/office/drawing/2014/main" id="{65778E59-500F-4BBA-BBEB-15CA7761D821}"/>
+                <a16:creationId xmlns:a16="http://schemas.microsoft.com/office/drawing/2014/main" xmlns="" id="{65778E59-500F-4BBA-BBEB-15CA7761D821}"/>
               </a:ext>
             </a:extLst>
           </p:cNvPr>
@@ -5677,7 +5625,7 @@
           <p:cNvPr id="8" name="29 Conector recto de flecha">
             <a:extLst>
               <a:ext uri="{FF2B5EF4-FFF2-40B4-BE49-F238E27FC236}">
-                <a16:creationId xmlns="" xmlns:a16="http://schemas.microsoft.com/office/drawing/2014/main" id="{E051F635-5666-428C-91BF-EB77E088BD3E}"/>
+                <a16:creationId xmlns:a16="http://schemas.microsoft.com/office/drawing/2014/main" xmlns="" id="{E051F635-5666-428C-91BF-EB77E088BD3E}"/>
               </a:ext>
             </a:extLst>
           </p:cNvPr>
@@ -5720,7 +5668,7 @@
           <p:cNvPr id="9" name="29 Conector recto de flecha">
             <a:extLst>
               <a:ext uri="{FF2B5EF4-FFF2-40B4-BE49-F238E27FC236}">
-                <a16:creationId xmlns="" xmlns:a16="http://schemas.microsoft.com/office/drawing/2014/main" id="{368B48B6-1D91-4A5A-8AF1-8D7599340E32}"/>
+                <a16:creationId xmlns:a16="http://schemas.microsoft.com/office/drawing/2014/main" xmlns="" id="{368B48B6-1D91-4A5A-8AF1-8D7599340E32}"/>
               </a:ext>
             </a:extLst>
           </p:cNvPr>
@@ -5763,7 +5711,7 @@
           <p:cNvPr id="10" name="20 Rectángulo redondeado">
             <a:extLst>
               <a:ext uri="{FF2B5EF4-FFF2-40B4-BE49-F238E27FC236}">
-                <a16:creationId xmlns="" xmlns:a16="http://schemas.microsoft.com/office/drawing/2014/main" id="{2192FED7-659F-4407-8CFF-4456388B0170}"/>
+                <a16:creationId xmlns:a16="http://schemas.microsoft.com/office/drawing/2014/main" xmlns="" id="{2192FED7-659F-4407-8CFF-4456388B0170}"/>
               </a:ext>
             </a:extLst>
           </p:cNvPr>
@@ -5824,7 +5772,7 @@
           <p:cNvPr id="11" name="29 Conector recto de flecha">
             <a:extLst>
               <a:ext uri="{FF2B5EF4-FFF2-40B4-BE49-F238E27FC236}">
-                <a16:creationId xmlns="" xmlns:a16="http://schemas.microsoft.com/office/drawing/2014/main" id="{69E812ED-0666-4472-8688-F2BACC743F10}"/>
+                <a16:creationId xmlns:a16="http://schemas.microsoft.com/office/drawing/2014/main" xmlns="" id="{69E812ED-0666-4472-8688-F2BACC743F10}"/>
               </a:ext>
             </a:extLst>
           </p:cNvPr>
@@ -5867,7 +5815,7 @@
           <p:cNvPr id="12" name="20 Rectángulo redondeado">
             <a:extLst>
               <a:ext uri="{FF2B5EF4-FFF2-40B4-BE49-F238E27FC236}">
-                <a16:creationId xmlns="" xmlns:a16="http://schemas.microsoft.com/office/drawing/2014/main" id="{D76E5583-47C5-41E8-95FB-F61D7CD0F83A}"/>
+                <a16:creationId xmlns:a16="http://schemas.microsoft.com/office/drawing/2014/main" xmlns="" id="{D76E5583-47C5-41E8-95FB-F61D7CD0F83A}"/>
               </a:ext>
             </a:extLst>
           </p:cNvPr>
@@ -5925,7 +5873,7 @@
           <p:cNvPr id="13" name="30 CuadroTexto">
             <a:extLst>
               <a:ext uri="{FF2B5EF4-FFF2-40B4-BE49-F238E27FC236}">
-                <a16:creationId xmlns="" xmlns:a16="http://schemas.microsoft.com/office/drawing/2014/main" id="{4C0646B8-2B7E-4579-AEF8-C28BED180070}"/>
+                <a16:creationId xmlns:a16="http://schemas.microsoft.com/office/drawing/2014/main" xmlns="" id="{4C0646B8-2B7E-4579-AEF8-C28BED180070}"/>
               </a:ext>
             </a:extLst>
           </p:cNvPr>
@@ -5965,7 +5913,7 @@
           <p:cNvPr id="14" name="30 CuadroTexto">
             <a:extLst>
               <a:ext uri="{FF2B5EF4-FFF2-40B4-BE49-F238E27FC236}">
-                <a16:creationId xmlns="" xmlns:a16="http://schemas.microsoft.com/office/drawing/2014/main" id="{6FAC7A1A-4EE0-4C6E-8C57-737F69FEEA58}"/>
+                <a16:creationId xmlns:a16="http://schemas.microsoft.com/office/drawing/2014/main" xmlns="" id="{6FAC7A1A-4EE0-4C6E-8C57-737F69FEEA58}"/>
               </a:ext>
             </a:extLst>
           </p:cNvPr>
@@ -6001,7 +5949,7 @@
           <p:cNvPr id="15" name="30 CuadroTexto">
             <a:extLst>
               <a:ext uri="{FF2B5EF4-FFF2-40B4-BE49-F238E27FC236}">
-                <a16:creationId xmlns="" xmlns:a16="http://schemas.microsoft.com/office/drawing/2014/main" id="{5B67840B-D3E7-4642-A33C-52505043E768}"/>
+                <a16:creationId xmlns:a16="http://schemas.microsoft.com/office/drawing/2014/main" xmlns="" id="{5B67840B-D3E7-4642-A33C-52505043E768}"/>
               </a:ext>
             </a:extLst>
           </p:cNvPr>
@@ -6036,7 +5984,7 @@
           <p:cNvPr id="16" name="20 Rectángulo redondeado">
             <a:extLst>
               <a:ext uri="{FF2B5EF4-FFF2-40B4-BE49-F238E27FC236}">
-                <a16:creationId xmlns="" xmlns:a16="http://schemas.microsoft.com/office/drawing/2014/main" id="{7938FCD4-2AEB-4A9C-BFA6-FF58F425573D}"/>
+                <a16:creationId xmlns:a16="http://schemas.microsoft.com/office/drawing/2014/main" xmlns="" id="{7938FCD4-2AEB-4A9C-BFA6-FF58F425573D}"/>
               </a:ext>
             </a:extLst>
           </p:cNvPr>
@@ -6097,7 +6045,7 @@
           <p:cNvPr id="17" name="20 Rectángulo redondeado">
             <a:extLst>
               <a:ext uri="{FF2B5EF4-FFF2-40B4-BE49-F238E27FC236}">
-                <a16:creationId xmlns="" xmlns:a16="http://schemas.microsoft.com/office/drawing/2014/main" id="{B23900D3-F75D-4DB5-9E90-01622476009D}"/>
+                <a16:creationId xmlns:a16="http://schemas.microsoft.com/office/drawing/2014/main" xmlns="" id="{B23900D3-F75D-4DB5-9E90-01622476009D}"/>
               </a:ext>
             </a:extLst>
           </p:cNvPr>
@@ -6155,7 +6103,7 @@
           <p:cNvPr id="18" name="20 Rectángulo redondeado">
             <a:extLst>
               <a:ext uri="{FF2B5EF4-FFF2-40B4-BE49-F238E27FC236}">
-                <a16:creationId xmlns="" xmlns:a16="http://schemas.microsoft.com/office/drawing/2014/main" id="{1246F69B-BB2E-4A7D-A003-51A90FC6A8E3}"/>
+                <a16:creationId xmlns:a16="http://schemas.microsoft.com/office/drawing/2014/main" xmlns="" id="{1246F69B-BB2E-4A7D-A003-51A90FC6A8E3}"/>
               </a:ext>
             </a:extLst>
           </p:cNvPr>
@@ -6216,7 +6164,7 @@
           <p:cNvPr id="19" name="29 Conector recto de flecha">
             <a:extLst>
               <a:ext uri="{FF2B5EF4-FFF2-40B4-BE49-F238E27FC236}">
-                <a16:creationId xmlns="" xmlns:a16="http://schemas.microsoft.com/office/drawing/2014/main" id="{CFC4C48E-16D9-42C2-B0C2-53604774CFE9}"/>
+                <a16:creationId xmlns:a16="http://schemas.microsoft.com/office/drawing/2014/main" xmlns="" id="{CFC4C48E-16D9-42C2-B0C2-53604774CFE9}"/>
               </a:ext>
             </a:extLst>
           </p:cNvPr>
@@ -6258,7 +6206,7 @@
           <p:cNvPr id="20" name="29 Conector recto de flecha">
             <a:extLst>
               <a:ext uri="{FF2B5EF4-FFF2-40B4-BE49-F238E27FC236}">
-                <a16:creationId xmlns="" xmlns:a16="http://schemas.microsoft.com/office/drawing/2014/main" id="{860EF899-AAAA-4D8A-9460-829FFCACD182}"/>
+                <a16:creationId xmlns:a16="http://schemas.microsoft.com/office/drawing/2014/main" xmlns="" id="{860EF899-AAAA-4D8A-9460-829FFCACD182}"/>
               </a:ext>
             </a:extLst>
           </p:cNvPr>
@@ -6301,7 +6249,7 @@
           <p:cNvPr id="21" name="29 Conector recto de flecha">
             <a:extLst>
               <a:ext uri="{FF2B5EF4-FFF2-40B4-BE49-F238E27FC236}">
-                <a16:creationId xmlns="" xmlns:a16="http://schemas.microsoft.com/office/drawing/2014/main" id="{58D3166F-4FB0-4CA8-A0BC-7E478E4C16DC}"/>
+                <a16:creationId xmlns:a16="http://schemas.microsoft.com/office/drawing/2014/main" xmlns="" id="{58D3166F-4FB0-4CA8-A0BC-7E478E4C16DC}"/>
               </a:ext>
             </a:extLst>
           </p:cNvPr>
@@ -6344,7 +6292,7 @@
           <p:cNvPr id="22" name="19 Grupo">
             <a:extLst>
               <a:ext uri="{FF2B5EF4-FFF2-40B4-BE49-F238E27FC236}">
-                <a16:creationId xmlns="" xmlns:a16="http://schemas.microsoft.com/office/drawing/2014/main" id="{72728B6F-9E0E-4855-9B6A-D98006B948B6}"/>
+                <a16:creationId xmlns:a16="http://schemas.microsoft.com/office/drawing/2014/main" xmlns="" id="{72728B6F-9E0E-4855-9B6A-D98006B948B6}"/>
               </a:ext>
             </a:extLst>
           </p:cNvPr>
@@ -6364,7 +6312,7 @@
             <p:cNvPr id="23" name="42 Conector">
               <a:extLst>
                 <a:ext uri="{FF2B5EF4-FFF2-40B4-BE49-F238E27FC236}">
-                  <a16:creationId xmlns="" xmlns:a16="http://schemas.microsoft.com/office/drawing/2014/main" id="{373A1267-C09A-4344-AB04-4D134201A6BE}"/>
+                  <a16:creationId xmlns:a16="http://schemas.microsoft.com/office/drawing/2014/main" xmlns="" id="{373A1267-C09A-4344-AB04-4D134201A6BE}"/>
                 </a:ext>
               </a:extLst>
             </p:cNvPr>
@@ -6421,7 +6369,7 @@
             <p:cNvPr id="24" name="43 Conector">
               <a:extLst>
                 <a:ext uri="{FF2B5EF4-FFF2-40B4-BE49-F238E27FC236}">
-                  <a16:creationId xmlns="" xmlns:a16="http://schemas.microsoft.com/office/drawing/2014/main" id="{63920072-F0D4-437F-AAD7-67A75B8A9057}"/>
+                  <a16:creationId xmlns:a16="http://schemas.microsoft.com/office/drawing/2014/main" xmlns="" id="{63920072-F0D4-437F-AAD7-67A75B8A9057}"/>
                 </a:ext>
               </a:extLst>
             </p:cNvPr>
@@ -6476,7 +6424,7 @@
           <p:cNvPr id="25" name="29 Conector recto de flecha">
             <a:extLst>
               <a:ext uri="{FF2B5EF4-FFF2-40B4-BE49-F238E27FC236}">
-                <a16:creationId xmlns="" xmlns:a16="http://schemas.microsoft.com/office/drawing/2014/main" id="{1583C8B5-133D-4254-92FD-B7F7E40F134F}"/>
+                <a16:creationId xmlns:a16="http://schemas.microsoft.com/office/drawing/2014/main" xmlns="" id="{1583C8B5-133D-4254-92FD-B7F7E40F134F}"/>
               </a:ext>
             </a:extLst>
           </p:cNvPr>
@@ -6519,7 +6467,7 @@
           <p:cNvPr id="26" name="36 Conector">
             <a:extLst>
               <a:ext uri="{FF2B5EF4-FFF2-40B4-BE49-F238E27FC236}">
-                <a16:creationId xmlns="" xmlns:a16="http://schemas.microsoft.com/office/drawing/2014/main" id="{11CC1446-9291-450E-9B53-2A15F8DBEF08}"/>
+                <a16:creationId xmlns:a16="http://schemas.microsoft.com/office/drawing/2014/main" xmlns="" id="{11CC1446-9291-450E-9B53-2A15F8DBEF08}"/>
               </a:ext>
             </a:extLst>
           </p:cNvPr>
@@ -6571,7 +6519,7 @@
           <p:cNvPr id="27" name="29 Conector recto de flecha">
             <a:extLst>
               <a:ext uri="{FF2B5EF4-FFF2-40B4-BE49-F238E27FC236}">
-                <a16:creationId xmlns="" xmlns:a16="http://schemas.microsoft.com/office/drawing/2014/main" id="{D6C31BC0-E444-49C8-BD7A-147BEB33D395}"/>
+                <a16:creationId xmlns:a16="http://schemas.microsoft.com/office/drawing/2014/main" xmlns="" id="{D6C31BC0-E444-49C8-BD7A-147BEB33D395}"/>
               </a:ext>
             </a:extLst>
           </p:cNvPr>
@@ -6906,7 +6854,7 @@
   <a:extraClrSchemeLst/>
   <a:extLst>
     <a:ext uri="{05A4C25C-085E-4340-85A3-A5531E510DB2}">
-      <thm15:themeFamily xmlns:thm15="http://schemas.microsoft.com/office/thememl/2012/main" xmlns="" name="Office Theme" id="{62F939B6-93AF-4DB8-9C6B-D6C7DFDC589F}" vid="{4A3C46E8-61CC-4603-A589-7422A47A8E4A}"/>
+      <thm15:themeFamily xmlns="" xmlns:thm15="http://schemas.microsoft.com/office/thememl/2012/main" name="Office Theme" id="{62F939B6-93AF-4DB8-9C6B-D6C7DFDC589F}" vid="{4A3C46E8-61CC-4603-A589-7422A47A8E4A}"/>
     </a:ext>
   </a:extLst>
 </a:theme>

</xml_diff>